<commit_message>
Add link to Codepen example
</commit_message>
<xml_diff>
--- a/Week_2/Workout1.pptx
+++ b/Week_2/Workout1.pptx
@@ -1905,7 +1905,7 @@
           <a:graphicData uri="http://schemas.openxmlformats.org/presentationml/2006/ole">
             <mc:AlternateContent xmlns:mc="http://schemas.openxmlformats.org/markup-compatibility/2006">
               <mc:Choice xmlns:v="urn:schemas-microsoft-com:vml" Requires="v">
-                <p:oleObj spid="_x0000_s713738" name="Photo Editor Photo" r:id="rId3" imgW="9142857" imgH="743054" progId="">
+                <p:oleObj spid="_x0000_s713739" name="Photo Editor Photo" r:id="rId3" imgW="9142857" imgH="743054" progId="">
                   <p:embed/>
                 </p:oleObj>
               </mc:Choice>
@@ -3534,7 +3534,7 @@
           <a:graphicData uri="http://schemas.openxmlformats.org/presentationml/2006/ole">
             <mc:AlternateContent xmlns:mc="http://schemas.openxmlformats.org/markup-compatibility/2006">
               <mc:Choice xmlns:v="urn:schemas-microsoft-com:vml" Requires="v">
-                <p:oleObj spid="_x0000_s715786" name="Photo Editor Photo" r:id="rId3" imgW="9142857" imgH="743054" progId="">
+                <p:oleObj spid="_x0000_s715787" name="Photo Editor Photo" r:id="rId3" imgW="9142857" imgH="743054" progId="">
                   <p:embed/>
                 </p:oleObj>
               </mc:Choice>
@@ -8651,7 +8651,7 @@
           <a:graphicData uri="http://schemas.openxmlformats.org/presentationml/2006/ole">
             <mc:AlternateContent xmlns:mc="http://schemas.openxmlformats.org/markup-compatibility/2006">
               <mc:Choice xmlns:v="urn:schemas-microsoft-com:vml" Requires="v">
-                <p:oleObj spid="_x0000_s1034" name="Photo Editor Photo" r:id="rId17" imgW="9142857" imgH="743054" progId="">
+                <p:oleObj spid="_x0000_s1035" name="Photo Editor Photo" r:id="rId17" imgW="9142857" imgH="743054" progId="">
                   <p:embed/>
                 </p:oleObj>
               </mc:Choice>
@@ -13082,7 +13082,7 @@
           <a:graphicData uri="http://schemas.openxmlformats.org/presentationml/2006/ole">
             <mc:AlternateContent xmlns:mc="http://schemas.openxmlformats.org/markup-compatibility/2006">
               <mc:Choice xmlns:v="urn:schemas-microsoft-com:vml" Requires="v">
-                <p:oleObj spid="_x0000_s714794" name="Photo Editor Photo" r:id="rId4" imgW="1467055" imgH="390580" progId="">
+                <p:oleObj spid="_x0000_s714799" name="Photo Editor Photo" r:id="rId4" imgW="1467055" imgH="390580" progId="">
                   <p:embed/>
                 </p:oleObj>
               </mc:Choice>
@@ -13333,7 +13333,7 @@
           <a:graphicData uri="http://schemas.openxmlformats.org/presentationml/2006/ole">
             <mc:AlternateContent xmlns:mc="http://schemas.openxmlformats.org/markup-compatibility/2006">
               <mc:Choice xmlns:v="urn:schemas-microsoft-com:vml" Requires="v">
-                <p:oleObj spid="_x0000_s714795" name="Photo Editor Photo" r:id="rId6" imgW="9142857" imgH="3610479" progId="">
+                <p:oleObj spid="_x0000_s714800" name="Photo Editor Photo" r:id="rId6" imgW="9142857" imgH="3610479" progId="">
                   <p:embed/>
                 </p:oleObj>
               </mc:Choice>
@@ -13426,7 +13426,7 @@
           <a:graphicData uri="http://schemas.openxmlformats.org/presentationml/2006/ole">
             <mc:AlternateContent xmlns:mc="http://schemas.openxmlformats.org/markup-compatibility/2006">
               <mc:Choice xmlns:v="urn:schemas-microsoft-com:vml" Requires="v">
-                <p:oleObj spid="_x0000_s714796" name="Photo Editor Photo" r:id="rId8" imgW="1142857" imgH="914286" progId="">
+                <p:oleObj spid="_x0000_s714801" name="Photo Editor Photo" r:id="rId8" imgW="1142857" imgH="914286" progId="">
                   <p:embed/>
                 </p:oleObj>
               </mc:Choice>
@@ -13519,7 +13519,7 @@
           <a:graphicData uri="http://schemas.openxmlformats.org/presentationml/2006/ole">
             <mc:AlternateContent xmlns:mc="http://schemas.openxmlformats.org/markup-compatibility/2006">
               <mc:Choice xmlns:v="urn:schemas-microsoft-com:vml" Requires="v">
-                <p:oleObj spid="_x0000_s714797" name="Photo Editor Photo" r:id="rId10" imgW="1142857" imgH="914286" progId="">
+                <p:oleObj spid="_x0000_s714802" name="Photo Editor Photo" r:id="rId10" imgW="1142857" imgH="914286" progId="">
                   <p:embed/>
                 </p:oleObj>
               </mc:Choice>
@@ -13612,7 +13612,7 @@
           <a:graphicData uri="http://schemas.openxmlformats.org/presentationml/2006/ole">
             <mc:AlternateContent xmlns:mc="http://schemas.openxmlformats.org/markup-compatibility/2006">
               <mc:Choice xmlns:v="urn:schemas-microsoft-com:vml" Requires="v">
-                <p:oleObj spid="_x0000_s714798" name="Photo Editor Photo" r:id="rId12" imgW="1142857" imgH="914286" progId="">
+                <p:oleObj spid="_x0000_s714803" name="Photo Editor Photo" r:id="rId12" imgW="1142857" imgH="914286" progId="">
                   <p:embed/>
                 </p:oleObj>
               </mc:Choice>
@@ -13945,7 +13945,7 @@
           <a:graphicData uri="http://schemas.openxmlformats.org/presentationml/2006/ole">
             <mc:AlternateContent xmlns:mc="http://schemas.openxmlformats.org/markup-compatibility/2006">
               <mc:Choice xmlns:v="urn:schemas-microsoft-com:vml" Requires="v">
-                <p:oleObj spid="_x0000_s716802" r:id="rId4" imgW="9142857" imgH="3610479" progId="">
+                <p:oleObj spid="_x0000_s716807" r:id="rId4" imgW="9142857" imgH="3610479" progId="">
                   <p:embed/>
                 </p:oleObj>
               </mc:Choice>
@@ -14019,7 +14019,7 @@
           <a:graphicData uri="http://schemas.openxmlformats.org/presentationml/2006/ole">
             <mc:AlternateContent xmlns:mc="http://schemas.openxmlformats.org/markup-compatibility/2006">
               <mc:Choice xmlns:v="urn:schemas-microsoft-com:vml" Requires="v">
-                <p:oleObj spid="_x0000_s716803" r:id="rId6" imgW="1467055" imgH="390580" progId="">
+                <p:oleObj spid="_x0000_s716808" r:id="rId6" imgW="1467055" imgH="390580" progId="">
                   <p:embed/>
                 </p:oleObj>
               </mc:Choice>
@@ -14295,7 +14295,7 @@
           <a:graphicData uri="http://schemas.openxmlformats.org/presentationml/2006/ole">
             <mc:AlternateContent xmlns:mc="http://schemas.openxmlformats.org/markup-compatibility/2006">
               <mc:Choice xmlns:v="urn:schemas-microsoft-com:vml" Requires="v">
-                <p:oleObj spid="_x0000_s716804" r:id="rId8" imgW="866896" imgH="704948" progId="">
+                <p:oleObj spid="_x0000_s716809" r:id="rId8" imgW="866896" imgH="704948" progId="">
                   <p:embed/>
                 </p:oleObj>
               </mc:Choice>
@@ -14369,7 +14369,7 @@
           <a:graphicData uri="http://schemas.openxmlformats.org/presentationml/2006/ole">
             <mc:AlternateContent xmlns:mc="http://schemas.openxmlformats.org/markup-compatibility/2006">
               <mc:Choice xmlns:v="urn:schemas-microsoft-com:vml" Requires="v">
-                <p:oleObj spid="_x0000_s716805" r:id="rId10" imgW="866896" imgH="704948" progId="">
+                <p:oleObj spid="_x0000_s716810" r:id="rId10" imgW="866896" imgH="704948" progId="">
                   <p:embed/>
                 </p:oleObj>
               </mc:Choice>
@@ -14443,7 +14443,7 @@
           <a:graphicData uri="http://schemas.openxmlformats.org/presentationml/2006/ole">
             <mc:AlternateContent xmlns:mc="http://schemas.openxmlformats.org/markup-compatibility/2006">
               <mc:Choice xmlns:v="urn:schemas-microsoft-com:vml" Requires="v">
-                <p:oleObj spid="_x0000_s716806" r:id="rId12" imgW="866896" imgH="704948" progId="">
+                <p:oleObj spid="_x0000_s716811" r:id="rId12" imgW="866896" imgH="704948" progId="">
                   <p:embed/>
                 </p:oleObj>
               </mc:Choice>
@@ -16997,6 +16997,29 @@
               </a:rPr>
               <a:t>/</a:t>
             </a:r>
+            <a:endParaRPr lang="en-US" sz="2000" u="sng" dirty="0" smtClean="0"/>
+          </a:p>
+          <a:p>
+            <a:pPr>
+              <a:buFont typeface="Arial" panose="020B0604020202020204" pitchFamily="34" charset="0"/>
+              <a:buChar char="•"/>
+            </a:pPr>
+            <a:r>
+              <a:rPr lang="en-US" sz="2000" u="sng" dirty="0">
+                <a:hlinkClick r:id="rId6"/>
+              </a:rPr>
+              <a:t>https://</a:t>
+            </a:r>
+            <a:r>
+              <a:rPr lang="en-US" sz="2000" u="sng" dirty="0" smtClean="0">
+                <a:hlinkClick r:id="rId6"/>
+              </a:rPr>
+              <a:t>codepen.io/damianfabian/pen/PGZzBv</a:t>
+            </a:r>
+            <a:endParaRPr lang="en-US" sz="2000" u="sng" dirty="0" smtClean="0"/>
+          </a:p>
+          <a:p>
+            <a:pPr marL="0" indent="0"/>
             <a:endParaRPr lang="en-US" sz="2000" u="sng" dirty="0" smtClean="0"/>
           </a:p>
           <a:p>

</xml_diff>